<commit_message>
Oleksiy removed old Chris code
</commit_message>
<xml_diff>
--- a/Final presentation/Final presentation template (Chicago Housing Prices) - 2.pptx
+++ b/Final presentation/Final presentation template (Chicago Housing Prices) - 2.pptx
@@ -28,23 +28,18 @@
   <p:notesSz cx="6858000" cy="9144000"/>
   <p:embeddedFontLst>
     <p:embeddedFont>
-      <p:font typeface="Avenir" panose="02000503020000020003" pitchFamily="2" charset="0"/>
+      <p:font typeface="Calibri" panose="020F0502020204030204" pitchFamily="34" charset="0"/>
       <p:regular r:id="rId18"/>
-      <p:italic r:id="rId19"/>
-    </p:embeddedFont>
-    <p:embeddedFont>
-      <p:font typeface="Calibri" panose="020F0502020204030204" pitchFamily="34" charset="0"/>
-      <p:regular r:id="rId20"/>
-      <p:bold r:id="rId21"/>
-      <p:italic r:id="rId22"/>
-      <p:boldItalic r:id="rId23"/>
+      <p:bold r:id="rId19"/>
+      <p:italic r:id="rId20"/>
+      <p:boldItalic r:id="rId21"/>
     </p:embeddedFont>
     <p:embeddedFont>
       <p:font typeface="Garamond" panose="02020404030301010803" pitchFamily="18" charset="0"/>
-      <p:regular r:id="rId24"/>
-      <p:bold r:id="rId25"/>
-      <p:italic r:id="rId26"/>
-      <p:boldItalic r:id="rId27"/>
+      <p:regular r:id="rId22"/>
+      <p:bold r:id="rId23"/>
+      <p:italic r:id="rId24"/>
+      <p:boldItalic r:id="rId25"/>
     </p:embeddedFont>
   </p:embeddedFontLst>
   <p:defaultTextStyle>
@@ -281,7 +276,7 @@
       <p15:sldGuideLst xmlns:p15="http://schemas.microsoft.com/office/powerpoint/2012/main"/>
     </p:ext>
     <p:ext uri="http://customooxmlschemas.google.com/">
-      <go:slidesCustomData xmlns="" xmlns:mc="http://schemas.openxmlformats.org/markup-compatibility/2006" xmlns:mv="urn:schemas-microsoft-com:mac:vml" xmlns:c="http://schemas.openxmlformats.org/drawingml/2006/chart" xmlns:dgm="http://schemas.openxmlformats.org/drawingml/2006/diagram" xmlns:o="urn:schemas-microsoft-com:office:office" xmlns:v="urn:schemas-microsoft-com:vml" xmlns:pvml="urn:schemas-microsoft-com:office:powerpoint" xmlns:com="http://schemas.openxmlformats.org/drawingml/2006/compatibility" xmlns:p14="http://schemas.microsoft.com/office/powerpoint/2010/main" xmlns:p15="http://schemas.microsoft.com/office/powerpoint/2012/main" xmlns:ahyp="http://schemas.microsoft.com/office/drawing/2018/hyperlinkcolor" xmlns:go="http://customooxmlschemas.google.com/" r:id="rId56" roundtripDataSignature="AMtx7mjTCzAL9hyNzH0wzHDgWhRNAeDhCw=="/>
+      <go:slidesCustomData xmlns:go="http://customooxmlschemas.google.com/" xmlns:ahyp="http://schemas.microsoft.com/office/drawing/2018/hyperlinkcolor" xmlns:p15="http://schemas.microsoft.com/office/powerpoint/2012/main" xmlns:p14="http://schemas.microsoft.com/office/powerpoint/2010/main" xmlns:com="http://schemas.openxmlformats.org/drawingml/2006/compatibility" xmlns:pvml="urn:schemas-microsoft-com:office:powerpoint" xmlns:v="urn:schemas-microsoft-com:vml" xmlns:o="urn:schemas-microsoft-com:office:office" xmlns:dgm="http://schemas.openxmlformats.org/drawingml/2006/diagram" xmlns:c="http://schemas.openxmlformats.org/drawingml/2006/chart" xmlns:mv="urn:schemas-microsoft-com:mac:vml" xmlns:mc="http://schemas.openxmlformats.org/markup-compatibility/2006" xmlns="" r:id="rId56" roundtripDataSignature="AMtx7mjTCzAL9hyNzH0wzHDgWhRNAeDhCw=="/>
     </p:ext>
   </p:extLst>
 </p:presentation>
@@ -3590,16 +3585,7 @@
               </a:spcAft>
               <a:buNone/>
             </a:pPr>
-            <a:r>
-              <a:rPr lang="en-US" u="sng">
-                <a:solidFill>
-                  <a:schemeClr val="hlink"/>
-                </a:solidFill>
-                <a:hlinkClick r:id="rId3"/>
-              </a:rPr>
-              <a:t>https://www.cnn.com/2020/07/28/business/starbucks-earnings-coronavirus/index.html</a:t>
-            </a:r>
-            <a:endParaRPr/>
+            <a:endParaRPr dirty="0"/>
           </a:p>
         </p:txBody>
       </p:sp>
@@ -4162,16 +4148,7 @@
               </a:spcAft>
               <a:buNone/>
             </a:pPr>
-            <a:r>
-              <a:rPr lang="en-US" u="sng">
-                <a:solidFill>
-                  <a:schemeClr val="hlink"/>
-                </a:solidFill>
-                <a:hlinkClick r:id="rId3"/>
-              </a:rPr>
-              <a:t>https://www.cnn.com/2020/07/28/business/starbucks-earnings-coronavirus/index.html</a:t>
-            </a:r>
-            <a:endParaRPr/>
+            <a:endParaRPr dirty="0"/>
           </a:p>
         </p:txBody>
       </p:sp>
@@ -4509,16 +4486,7 @@
               </a:spcAft>
               <a:buNone/>
             </a:pPr>
-            <a:r>
-              <a:rPr lang="en-US" u="sng">
-                <a:solidFill>
-                  <a:schemeClr val="hlink"/>
-                </a:solidFill>
-                <a:hlinkClick r:id="rId3"/>
-              </a:rPr>
-              <a:t>https://www.cnn.com/2020/07/28/business/starbucks-earnings-coronavirus/index.html</a:t>
-            </a:r>
-            <a:endParaRPr/>
+            <a:endParaRPr dirty="0"/>
           </a:p>
         </p:txBody>
       </p:sp>

</xml_diff>